<commit_message>
+ Modification du diapos
</commit_message>
<xml_diff>
--- a/PFE/Presentation/presentation - Abdelali.pptx
+++ b/PFE/Presentation/presentation - Abdelali.pptx
@@ -1050,9 +1050,6 @@
             </a:rPr>
             <a:t>algorithme. La performance n’était donc pas une contrainte</a:t>
           </a:r>
-          <a:endParaRPr lang="fr-FR" sz="1400" dirty="0">
-            <a:latin typeface="Agency FB" pitchFamily="34" charset="0"/>
-          </a:endParaRPr>
         </a:p>
       </dgm:t>
     </dgm:pt>
@@ -1130,6 +1127,13 @@
         </dgm:presLayoutVars>
       </dgm:prSet>
       <dgm:spPr/>
+      <dgm:t>
+        <a:bodyPr/>
+        <a:lstStyle/>
+        <a:p>
+          <a:endParaRPr lang="fr-FR"/>
+        </a:p>
+      </dgm:t>
     </dgm:pt>
     <dgm:pt modelId="{1399DD1A-5833-4BD0-9E1E-191C15FB9F49}" type="pres">
       <dgm:prSet presAssocID="{9F241392-152F-401F-96C7-BA2B911BB823}" presName="bullet4c" presStyleLbl="node1" presStyleIdx="2" presStyleCnt="4"/>
@@ -1172,13 +1176,13 @@
   </dgm:ptLst>
   <dgm:cxnLst>
     <dgm:cxn modelId="{6FDE6C8A-2427-447F-9B1F-913265EDFC4F}" srcId="{AE75F7A6-3303-4AFA-A575-D3A6A6F8E9CE}" destId="{A0F5A439-4267-451A-8594-1D366A6BB66C}" srcOrd="0" destOrd="0" parTransId="{7C9D7333-6DE0-4E3F-82D8-1DBBD5669DB1}" sibTransId="{A3637E50-4ECB-420D-8792-1903D01391A8}"/>
-    <dgm:cxn modelId="{542530BF-7F7B-4157-B2FA-F7CA4759CE31}" type="presOf" srcId="{AE75F7A6-3303-4AFA-A575-D3A6A6F8E9CE}" destId="{E496165D-AA51-4B0F-850B-EB3C6A148DC5}" srcOrd="0" destOrd="0" presId="urn:microsoft.com/office/officeart/2005/8/layout/arrow2"/>
-    <dgm:cxn modelId="{5B49B73C-5413-466E-81AC-CFCEAD504125}" type="presOf" srcId="{E4C07ECF-D9F9-4415-87B8-C18806A37336}" destId="{094B9AEB-6D4D-4537-8E83-B073A2900C3B}" srcOrd="0" destOrd="0" presId="urn:microsoft.com/office/officeart/2005/8/layout/arrow2"/>
+    <dgm:cxn modelId="{97E0FCAE-E5CB-4F69-A65C-91410C46D52D}" srcId="{AE75F7A6-3303-4AFA-A575-D3A6A6F8E9CE}" destId="{9F241392-152F-401F-96C7-BA2B911BB823}" srcOrd="2" destOrd="0" parTransId="{367512AE-4474-4BC4-94AF-31B40D1E57D1}" sibTransId="{09F2898A-67F4-48AD-BBA4-ED6F8D4B5992}"/>
     <dgm:cxn modelId="{053CB8E6-8AF7-4DCA-AA30-CF9DB2ECF6D4}" type="presOf" srcId="{9F241392-152F-401F-96C7-BA2B911BB823}" destId="{A70DF0DF-04CA-4C95-9086-2244E3FF668C}" srcOrd="0" destOrd="0" presId="urn:microsoft.com/office/officeart/2005/8/layout/arrow2"/>
     <dgm:cxn modelId="{39A56922-8F0D-49BA-9327-101B7D055CFB}" srcId="{AE75F7A6-3303-4AFA-A575-D3A6A6F8E9CE}" destId="{B4699B8E-9F92-4AD0-AB33-0C243800519C}" srcOrd="3" destOrd="0" parTransId="{33C106EB-6ACF-4CFA-9017-45EF2F00B9A4}" sibTransId="{43FBF13D-F8E5-4896-9A79-E1D7643618A8}"/>
+    <dgm:cxn modelId="{3647069A-F7B8-4CB6-9879-ECDB984AE1CF}" type="presOf" srcId="{B4699B8E-9F92-4AD0-AB33-0C243800519C}" destId="{2DCA7AFC-D71D-445D-AA05-7F9F09CB719B}" srcOrd="0" destOrd="0" presId="urn:microsoft.com/office/officeart/2005/8/layout/arrow2"/>
+    <dgm:cxn modelId="{542530BF-7F7B-4157-B2FA-F7CA4759CE31}" type="presOf" srcId="{AE75F7A6-3303-4AFA-A575-D3A6A6F8E9CE}" destId="{E496165D-AA51-4B0F-850B-EB3C6A148DC5}" srcOrd="0" destOrd="0" presId="urn:microsoft.com/office/officeart/2005/8/layout/arrow2"/>
     <dgm:cxn modelId="{C621C878-42FC-43B6-9702-71F8E2C7135A}" type="presOf" srcId="{A0F5A439-4267-451A-8594-1D366A6BB66C}" destId="{D2CB764E-58E0-492B-A5D2-596BDE86DFFD}" srcOrd="0" destOrd="0" presId="urn:microsoft.com/office/officeart/2005/8/layout/arrow2"/>
-    <dgm:cxn modelId="{3647069A-F7B8-4CB6-9879-ECDB984AE1CF}" type="presOf" srcId="{B4699B8E-9F92-4AD0-AB33-0C243800519C}" destId="{2DCA7AFC-D71D-445D-AA05-7F9F09CB719B}" srcOrd="0" destOrd="0" presId="urn:microsoft.com/office/officeart/2005/8/layout/arrow2"/>
-    <dgm:cxn modelId="{97E0FCAE-E5CB-4F69-A65C-91410C46D52D}" srcId="{AE75F7A6-3303-4AFA-A575-D3A6A6F8E9CE}" destId="{9F241392-152F-401F-96C7-BA2B911BB823}" srcOrd="2" destOrd="0" parTransId="{367512AE-4474-4BC4-94AF-31B40D1E57D1}" sibTransId="{09F2898A-67F4-48AD-BBA4-ED6F8D4B5992}"/>
+    <dgm:cxn modelId="{5B49B73C-5413-466E-81AC-CFCEAD504125}" type="presOf" srcId="{E4C07ECF-D9F9-4415-87B8-C18806A37336}" destId="{094B9AEB-6D4D-4537-8E83-B073A2900C3B}" srcOrd="0" destOrd="0" presId="urn:microsoft.com/office/officeart/2005/8/layout/arrow2"/>
     <dgm:cxn modelId="{391063E3-C194-4CBC-A72D-0E5DC4CA471A}" srcId="{AE75F7A6-3303-4AFA-A575-D3A6A6F8E9CE}" destId="{E4C07ECF-D9F9-4415-87B8-C18806A37336}" srcOrd="1" destOrd="0" parTransId="{7A167F7F-B67D-4A81-A5E9-D3067951360F}" sibTransId="{A5859316-B173-48E5-9B9F-93B278BBFA1D}"/>
     <dgm:cxn modelId="{7BD3470D-955D-446D-9869-5DF928B91A8B}" type="presParOf" srcId="{E496165D-AA51-4B0F-850B-EB3C6A148DC5}" destId="{10B30FBF-5A3F-4310-90F8-D9B2E0525A7A}" srcOrd="0" destOrd="0" presId="urn:microsoft.com/office/officeart/2005/8/layout/arrow2"/>
     <dgm:cxn modelId="{3ADC10C4-A067-41D3-A937-E8B03B13D9C4}" type="presParOf" srcId="{E496165D-AA51-4B0F-850B-EB3C6A148DC5}" destId="{6E7561B4-6011-4F50-9EE2-8E4105A3D453}" srcOrd="1" destOrd="0" presId="urn:microsoft.com/office/officeart/2005/8/layout/arrow2"/>
@@ -1577,9 +1581,6 @@
             </a:rPr>
             <a:t>algorithme. La performance n’était donc pas une contrainte</a:t>
           </a:r>
-          <a:endParaRPr lang="fr-FR" sz="1400" kern="1200" dirty="0">
-            <a:latin typeface="Agency FB" pitchFamily="34" charset="0"/>
-          </a:endParaRPr>
         </a:p>
       </dsp:txBody>
       <dsp:txXfrm>
@@ -23309,10 +23310,68 @@
         </p:nvSpPr>
         <p:spPr>
           <a:xfrm>
-            <a:off x="4860032" y="908720"/>
-            <a:ext cx="936104" cy="648072"/>
+            <a:off x="4788024" y="908720"/>
+            <a:ext cx="1296144" cy="648072"/>
           </a:xfrm>
           <a:prstGeom prst="verticalScroll">
+            <a:avLst/>
+          </a:prstGeom>
+        </p:spPr>
+        <p:style>
+          <a:lnRef idx="2">
+            <a:schemeClr val="accent1">
+              <a:shade val="50000"/>
+            </a:schemeClr>
+          </a:lnRef>
+          <a:fillRef idx="1">
+            <a:schemeClr val="accent1"/>
+          </a:fillRef>
+          <a:effectRef idx="0">
+            <a:schemeClr val="accent1"/>
+          </a:effectRef>
+          <a:fontRef idx="minor">
+            <a:schemeClr val="lt1"/>
+          </a:fontRef>
+        </p:style>
+        <p:txBody>
+          <a:bodyPr rtlCol="0" anchor="ctr"/>
+          <a:lstStyle/>
+          <a:p>
+            <a:pPr algn="ctr"/>
+            <a:r>
+              <a:rPr lang="fr-FR" sz="1800" dirty="0" smtClean="0">
+                <a:solidFill>
+                  <a:schemeClr val="tx1">
+                    <a:lumMod val="95000"/>
+                    <a:lumOff val="5000"/>
+                  </a:schemeClr>
+                </a:solidFill>
+              </a:rPr>
+              <a:t>Fichier d’entrée</a:t>
+            </a:r>
+            <a:endParaRPr lang="fr-FR" sz="1800" dirty="0">
+              <a:solidFill>
+                <a:schemeClr val="tx1">
+                  <a:lumMod val="95000"/>
+                  <a:lumOff val="5000"/>
+                </a:schemeClr>
+              </a:solidFill>
+            </a:endParaRPr>
+          </a:p>
+        </p:txBody>
+      </p:sp>
+      <p:sp>
+        <p:nvSpPr>
+          <p:cNvPr id="81" name="Flèche vers le bas 80"/>
+          <p:cNvSpPr/>
+          <p:nvPr/>
+        </p:nvSpPr>
+        <p:spPr>
+          <a:xfrm>
+            <a:off x="5292080" y="1628800"/>
+            <a:ext cx="216024" cy="504056"/>
+          </a:xfrm>
+          <a:prstGeom prst="downArrow">
             <a:avLst/>
           </a:prstGeom>
         </p:spPr>
@@ -23343,13 +23402,71 @@
       </p:sp>
       <p:sp>
         <p:nvSpPr>
-          <p:cNvPr id="81" name="Flèche vers le bas 80"/>
+          <p:cNvPr id="71" name="Parchemin vertical 70"/>
           <p:cNvSpPr/>
           <p:nvPr/>
         </p:nvSpPr>
         <p:spPr>
           <a:xfrm>
-            <a:off x="5292080" y="1628800"/>
+            <a:off x="4860032" y="6021288"/>
+            <a:ext cx="1296144" cy="648072"/>
+          </a:xfrm>
+          <a:prstGeom prst="verticalScroll">
+            <a:avLst/>
+          </a:prstGeom>
+        </p:spPr>
+        <p:style>
+          <a:lnRef idx="2">
+            <a:schemeClr val="accent1">
+              <a:shade val="50000"/>
+            </a:schemeClr>
+          </a:lnRef>
+          <a:fillRef idx="1">
+            <a:schemeClr val="accent1"/>
+          </a:fillRef>
+          <a:effectRef idx="0">
+            <a:schemeClr val="accent1"/>
+          </a:effectRef>
+          <a:fontRef idx="minor">
+            <a:schemeClr val="lt1"/>
+          </a:fontRef>
+        </p:style>
+        <p:txBody>
+          <a:bodyPr rtlCol="0" anchor="ctr"/>
+          <a:lstStyle/>
+          <a:p>
+            <a:pPr algn="ctr"/>
+            <a:r>
+              <a:rPr lang="fr-FR" sz="1800" dirty="0" smtClean="0">
+                <a:solidFill>
+                  <a:schemeClr val="tx1">
+                    <a:lumMod val="95000"/>
+                    <a:lumOff val="5000"/>
+                  </a:schemeClr>
+                </a:solidFill>
+              </a:rPr>
+              <a:t>Fichier Résultat</a:t>
+            </a:r>
+            <a:endParaRPr lang="fr-FR" sz="1800" dirty="0">
+              <a:solidFill>
+                <a:schemeClr val="tx1">
+                  <a:lumMod val="95000"/>
+                  <a:lumOff val="5000"/>
+                </a:schemeClr>
+              </a:solidFill>
+            </a:endParaRPr>
+          </a:p>
+        </p:txBody>
+      </p:sp>
+      <p:sp>
+        <p:nvSpPr>
+          <p:cNvPr id="77" name="Flèche vers le bas 76"/>
+          <p:cNvSpPr/>
+          <p:nvPr/>
+        </p:nvSpPr>
+        <p:spPr>
+          <a:xfrm>
+            <a:off x="5292080" y="5445224"/>
             <a:ext cx="216024" cy="504056"/>
           </a:xfrm>
           <a:prstGeom prst="downArrow">
@@ -26861,18 +26978,7 @@
                             </a:schemeClr>
                           </a:solidFill>
                         </a:rPr>
-                        <a:t>Etat </a:t>
-                      </a:r>
-                      <a:r>
-                        <a:rPr lang="fr-FR" dirty="0" smtClean="0">
-                          <a:solidFill>
-                            <a:schemeClr val="tx1">
-                              <a:lumMod val="95000"/>
-                              <a:lumOff val="5000"/>
-                            </a:schemeClr>
-                          </a:solidFill>
-                        </a:rPr>
-                        <a:t>d’avancement</a:t>
+                        <a:t>Etat d’avancement</a:t>
                       </a:r>
                       <a:endParaRPr lang="fr-FR" dirty="0">
                         <a:solidFill>

</xml_diff>

<commit_message>
+ Prise en compte des remarques de Mme Frydman
</commit_message>
<xml_diff>
--- a/PFE/Presentation/presentation - Abdelali.pptx
+++ b/PFE/Presentation/presentation - Abdelali.pptx
@@ -5,10 +5,10 @@
     <p:sldMasterId id="2147483648" r:id="rId1"/>
   </p:sldMasterIdLst>
   <p:notesMasterIdLst>
-    <p:notesMasterId r:id="rId8"/>
+    <p:notesMasterId r:id="rId9"/>
   </p:notesMasterIdLst>
   <p:handoutMasterIdLst>
-    <p:handoutMasterId r:id="rId9"/>
+    <p:handoutMasterId r:id="rId10"/>
   </p:handoutMasterIdLst>
   <p:sldIdLst>
     <p:sldId id="292" r:id="rId2"/>
@@ -17,6 +17,7 @@
     <p:sldId id="277" r:id="rId5"/>
     <p:sldId id="259" r:id="rId6"/>
     <p:sldId id="279" r:id="rId7"/>
+    <p:sldId id="293" r:id="rId8"/>
   </p:sldIdLst>
   <p:sldSz cx="9144000" cy="6858000" type="screen4x3"/>
   <p:notesSz cx="6858000" cy="9144000"/>
@@ -910,12 +911,18 @@
         <a:lstStyle/>
         <a:p>
           <a:r>
-            <a:rPr lang="fr-FR" sz="1400" dirty="0" smtClean="0">
+            <a:rPr lang="fr-FR" sz="1400" b="1" dirty="0" smtClean="0">
               <a:latin typeface="Agency FB" pitchFamily="34" charset="0"/>
             </a:rPr>
-            <a:t>Simplicité de la modélisation</a:t>
+            <a:t>Simplicité de la </a:t>
           </a:r>
-          <a:endParaRPr lang="fr-FR" sz="1400" dirty="0">
+          <a:r>
+            <a:rPr lang="fr-FR" sz="1400" b="1" dirty="0" smtClean="0">
+              <a:latin typeface="Agency FB" pitchFamily="34" charset="0"/>
+            </a:rPr>
+            <a:t>modélisation.</a:t>
+          </a:r>
+          <a:endParaRPr lang="fr-FR" sz="1400" b="1" dirty="0">
             <a:latin typeface="Agency FB" pitchFamily="34" charset="0"/>
           </a:endParaRPr>
         </a:p>
@@ -955,12 +962,12 @@
         <a:lstStyle/>
         <a:p>
           <a:r>
-            <a:rPr lang="fr-FR" sz="1400" dirty="0" smtClean="0">
+            <a:rPr lang="fr-FR" sz="1400" b="1" dirty="0" smtClean="0">
               <a:latin typeface="Agency FB" pitchFamily="34" charset="0"/>
             </a:rPr>
             <a:t>Grand catalogue de fonctionnalités prédéfinies.</a:t>
           </a:r>
-          <a:endParaRPr lang="fr-FR" sz="1400" dirty="0">
+          <a:endParaRPr lang="fr-FR" sz="1400" b="1" dirty="0">
             <a:latin typeface="Agency FB" pitchFamily="34" charset="0"/>
           </a:endParaRPr>
         </a:p>
@@ -1000,12 +1007,24 @@
         <a:lstStyle/>
         <a:p>
           <a:r>
-            <a:rPr lang="fr-FR" sz="1400" dirty="0" smtClean="0">
+            <a:rPr lang="fr-FR" sz="1400" b="1" dirty="0" smtClean="0">
               <a:latin typeface="Agency FB" pitchFamily="34" charset="0"/>
             </a:rPr>
-            <a:t>Projet n’étant qu’une maquette et ne servant qu’à la validation de notre</a:t>
+            <a:t>Maquette  de validation </a:t>
           </a:r>
-          <a:endParaRPr lang="fr-FR" sz="1400" dirty="0">
+          <a:r>
+            <a:rPr lang="fr-FR" sz="1400" b="1" dirty="0" smtClean="0">
+              <a:latin typeface="Agency FB" pitchFamily="34" charset="0"/>
+            </a:rPr>
+            <a:t>de </a:t>
+          </a:r>
+          <a:r>
+            <a:rPr lang="fr-FR" sz="1400" b="1" dirty="0" smtClean="0">
+              <a:latin typeface="Agency FB" pitchFamily="34" charset="0"/>
+            </a:rPr>
+            <a:t>notre solution.</a:t>
+          </a:r>
+          <a:endParaRPr lang="fr-FR" sz="1400" b="1" dirty="0">
             <a:latin typeface="Agency FB" pitchFamily="34" charset="0"/>
           </a:endParaRPr>
         </a:p>
@@ -1045,11 +1064,14 @@
         <a:lstStyle/>
         <a:p>
           <a:r>
-            <a:rPr lang="fr-FR" sz="1400" dirty="0">
+            <a:rPr lang="fr-FR" sz="1400" b="1" dirty="0" smtClean="0">
               <a:latin typeface="Agency FB" pitchFamily="34" charset="0"/>
             </a:rPr>
-            <a:t>algorithme. La performance n’était donc pas une contrainte</a:t>
+            <a:t>Pas de contraintes de performance.</a:t>
           </a:r>
+          <a:endParaRPr lang="fr-FR" sz="1400" b="1" dirty="0">
+            <a:latin typeface="Agency FB" pitchFamily="34" charset="0"/>
+          </a:endParaRPr>
         </a:p>
       </dgm:t>
     </dgm:pt>
@@ -1102,7 +1124,7 @@
       <dgm:spPr/>
     </dgm:pt>
     <dgm:pt modelId="{D2CB764E-58E0-492B-A5D2-596BDE86DFFD}" type="pres">
-      <dgm:prSet presAssocID="{A0F5A439-4267-451A-8594-1D366A6BB66C}" presName="textBox4a" presStyleLbl="revTx" presStyleIdx="0" presStyleCnt="4">
+      <dgm:prSet presAssocID="{A0F5A439-4267-451A-8594-1D366A6BB66C}" presName="textBox4a" presStyleLbl="revTx" presStyleIdx="0" presStyleCnt="4" custScaleX="199255" custScaleY="81864" custLinFactNeighborX="38702" custLinFactNeighborY="-1780">
         <dgm:presLayoutVars>
           <dgm:bulletEnabled val="1"/>
         </dgm:presLayoutVars>
@@ -1121,7 +1143,7 @@
       <dgm:spPr/>
     </dgm:pt>
     <dgm:pt modelId="{094B9AEB-6D4D-4537-8E83-B073A2900C3B}" type="pres">
-      <dgm:prSet presAssocID="{E4C07ECF-D9F9-4415-87B8-C18806A37336}" presName="textBox4b" presStyleLbl="revTx" presStyleIdx="1" presStyleCnt="4">
+      <dgm:prSet presAssocID="{E4C07ECF-D9F9-4415-87B8-C18806A37336}" presName="textBox4b" presStyleLbl="revTx" presStyleIdx="1" presStyleCnt="4" custScaleX="119487" custScaleY="87395">
         <dgm:presLayoutVars>
           <dgm:bulletEnabled val="1"/>
         </dgm:presLayoutVars>
@@ -1140,7 +1162,7 @@
       <dgm:spPr/>
     </dgm:pt>
     <dgm:pt modelId="{A70DF0DF-04CA-4C95-9086-2244E3FF668C}" type="pres">
-      <dgm:prSet presAssocID="{9F241392-152F-401F-96C7-BA2B911BB823}" presName="textBox4c" presStyleLbl="revTx" presStyleIdx="2" presStyleCnt="4">
+      <dgm:prSet presAssocID="{9F241392-152F-401F-96C7-BA2B911BB823}" presName="textBox4c" presStyleLbl="revTx" presStyleIdx="2" presStyleCnt="4" custScaleY="86551" custLinFactNeighborX="-23676" custLinFactNeighborY="2676">
         <dgm:presLayoutVars>
           <dgm:bulletEnabled val="1"/>
         </dgm:presLayoutVars>
@@ -1159,7 +1181,7 @@
       <dgm:spPr/>
     </dgm:pt>
     <dgm:pt modelId="{2DCA7AFC-D71D-445D-AA05-7F9F09CB719B}" type="pres">
-      <dgm:prSet presAssocID="{B4699B8E-9F92-4AD0-AB33-0C243800519C}" presName="textBox4d" presStyleLbl="revTx" presStyleIdx="3" presStyleCnt="4">
+      <dgm:prSet presAssocID="{B4699B8E-9F92-4AD0-AB33-0C243800519C}" presName="textBox4d" presStyleLbl="revTx" presStyleIdx="3" presStyleCnt="4" custScaleX="183116" custScaleY="88185" custLinFactNeighborY="2307">
         <dgm:presLayoutVars>
           <dgm:bulletEnabled val="1"/>
         </dgm:presLayoutVars>
@@ -1220,8 +1242,8 @@
       </dsp:nvSpPr>
       <dsp:spPr>
         <a:xfrm>
-          <a:off x="100022" y="0"/>
-          <a:ext cx="5440243" cy="3400151"/>
+          <a:off x="25839" y="0"/>
+          <a:ext cx="5440243" cy="3400152"/>
         </a:xfrm>
         <a:prstGeom prst="swooshArrow">
           <a:avLst>
@@ -1304,7 +1326,7 @@
       </dsp:nvSpPr>
       <dsp:spPr>
         <a:xfrm>
-          <a:off x="635886" y="2528353"/>
+          <a:off x="561703" y="2528353"/>
           <a:ext cx="125125" cy="125125"/>
         </a:xfrm>
         <a:prstGeom prst="ellipse">
@@ -1387,8 +1409,8 @@
       </dsp:nvSpPr>
       <dsp:spPr>
         <a:xfrm>
-          <a:off x="698449" y="2590915"/>
-          <a:ext cx="930281" cy="809236"/>
+          <a:off x="522628" y="2649892"/>
+          <a:ext cx="1853632" cy="662473"/>
         </a:xfrm>
         <a:prstGeom prst="rect">
           <a:avLst/>
@@ -1429,19 +1451,31 @@
             </a:spcAft>
           </a:pPr>
           <a:r>
-            <a:rPr lang="fr-FR" sz="1400" kern="1200" dirty="0" smtClean="0">
+            <a:rPr lang="fr-FR" sz="1400" b="1" kern="1200" dirty="0" smtClean="0">
               <a:latin typeface="Agency FB" pitchFamily="34" charset="0"/>
             </a:rPr>
-            <a:t>Projet n’étant qu’une maquette et ne servant qu’à la validation de notre</a:t>
+            <a:t>Maquette  de validation </a:t>
           </a:r>
-          <a:endParaRPr lang="fr-FR" sz="1400" kern="1200" dirty="0">
+          <a:r>
+            <a:rPr lang="fr-FR" sz="1400" b="1" kern="1200" dirty="0" smtClean="0">
+              <a:latin typeface="Agency FB" pitchFamily="34" charset="0"/>
+            </a:rPr>
+            <a:t>de </a:t>
+          </a:r>
+          <a:r>
+            <a:rPr lang="fr-FR" sz="1400" b="1" kern="1200" dirty="0" smtClean="0">
+              <a:latin typeface="Agency FB" pitchFamily="34" charset="0"/>
+            </a:rPr>
+            <a:t>notre solution.</a:t>
+          </a:r>
+          <a:endParaRPr lang="fr-FR" sz="1400" b="1" kern="1200" dirty="0">
             <a:latin typeface="Agency FB" pitchFamily="34" charset="0"/>
           </a:endParaRPr>
         </a:p>
       </dsp:txBody>
       <dsp:txXfrm>
-        <a:off x="698449" y="2590915"/>
-        <a:ext cx="930281" cy="809236"/>
+        <a:off x="522628" y="2649892"/>
+        <a:ext cx="1853632" cy="662473"/>
       </dsp:txXfrm>
     </dsp:sp>
     <dsp:sp modelId="{26E5449B-331A-4F72-8339-B3EB7455C40E}">
@@ -1451,7 +1485,7 @@
       </dsp:nvSpPr>
       <dsp:spPr>
         <a:xfrm>
-          <a:off x="1519925" y="1737477"/>
+          <a:off x="1445743" y="1737477"/>
           <a:ext cx="217609" cy="217609"/>
         </a:xfrm>
         <a:prstGeom prst="ellipse">
@@ -1534,8 +1568,8 @@
       </dsp:nvSpPr>
       <dsp:spPr>
         <a:xfrm>
-          <a:off x="1628730" y="1846282"/>
-          <a:ext cx="1142451" cy="1553869"/>
+          <a:off x="1443233" y="1944215"/>
+          <a:ext cx="1365080" cy="1358004"/>
         </a:xfrm>
         <a:prstGeom prst="rect">
           <a:avLst/>
@@ -1576,16 +1610,19 @@
             </a:spcAft>
           </a:pPr>
           <a:r>
-            <a:rPr lang="fr-FR" sz="1400" kern="1200" dirty="0">
+            <a:rPr lang="fr-FR" sz="1400" b="1" kern="1200" dirty="0" smtClean="0">
               <a:latin typeface="Agency FB" pitchFamily="34" charset="0"/>
             </a:rPr>
-            <a:t>algorithme. La performance n’était donc pas une contrainte</a:t>
+            <a:t>Pas de contraintes de performance.</a:t>
           </a:r>
+          <a:endParaRPr lang="fr-FR" sz="1400" b="1" kern="1200" dirty="0">
+            <a:latin typeface="Agency FB" pitchFamily="34" charset="0"/>
+          </a:endParaRPr>
         </a:p>
       </dsp:txBody>
       <dsp:txXfrm>
-        <a:off x="1628730" y="1846282"/>
-        <a:ext cx="1142451" cy="1553869"/>
+        <a:off x="1443233" y="1944215"/>
+        <a:ext cx="1365080" cy="1358004"/>
       </dsp:txXfrm>
     </dsp:sp>
     <dsp:sp modelId="{1399DD1A-5833-4BD0-9E1E-191C15FB9F49}">
@@ -1595,7 +1632,7 @@
       </dsp:nvSpPr>
       <dsp:spPr>
         <a:xfrm>
-          <a:off x="2648776" y="1154691"/>
+          <a:off x="2574593" y="1154691"/>
           <a:ext cx="288332" cy="288332"/>
         </a:xfrm>
         <a:prstGeom prst="ellipse">
@@ -1678,8 +1715,8 @@
       </dsp:nvSpPr>
       <dsp:spPr>
         <a:xfrm>
-          <a:off x="2792942" y="1298858"/>
-          <a:ext cx="1142451" cy="2101293"/>
+          <a:off x="2448273" y="1496390"/>
+          <a:ext cx="1142451" cy="1818690"/>
         </a:xfrm>
         <a:prstGeom prst="rect">
           <a:avLst/>
@@ -1720,19 +1757,25 @@
             </a:spcAft>
           </a:pPr>
           <a:r>
-            <a:rPr lang="fr-FR" sz="1400" kern="1200" dirty="0" smtClean="0">
+            <a:rPr lang="fr-FR" sz="1400" b="1" kern="1200" dirty="0" smtClean="0">
               <a:latin typeface="Agency FB" pitchFamily="34" charset="0"/>
             </a:rPr>
-            <a:t>Simplicité de la modélisation</a:t>
+            <a:t>Simplicité de la </a:t>
           </a:r>
-          <a:endParaRPr lang="fr-FR" sz="1400" kern="1200" dirty="0">
+          <a:r>
+            <a:rPr lang="fr-FR" sz="1400" b="1" kern="1200" dirty="0" smtClean="0">
+              <a:latin typeface="Agency FB" pitchFamily="34" charset="0"/>
+            </a:rPr>
+            <a:t>modélisation.</a:t>
+          </a:r>
+          <a:endParaRPr lang="fr-FR" sz="1400" b="1" kern="1200" dirty="0">
             <a:latin typeface="Agency FB" pitchFamily="34" charset="0"/>
           </a:endParaRPr>
         </a:p>
       </dsp:txBody>
       <dsp:txXfrm>
-        <a:off x="2792942" y="1298858"/>
-        <a:ext cx="1142451" cy="2101293"/>
+        <a:off x="2448273" y="1496390"/>
+        <a:ext cx="1142451" cy="1818690"/>
       </dsp:txXfrm>
     </dsp:sp>
     <dsp:sp modelId="{15323871-A3A3-474D-9C0A-33A72A407F66}">
@@ -1742,7 +1785,7 @@
       </dsp:nvSpPr>
       <dsp:spPr>
         <a:xfrm>
-          <a:off x="3878271" y="769114"/>
+          <a:off x="3804088" y="769114"/>
           <a:ext cx="386257" cy="386257"/>
         </a:xfrm>
         <a:prstGeom prst="ellipse">
@@ -1825,8 +1868,8 @@
       </dsp:nvSpPr>
       <dsp:spPr>
         <a:xfrm>
-          <a:off x="4071399" y="962243"/>
-          <a:ext cx="1142451" cy="2437908"/>
+          <a:off x="3522437" y="1162505"/>
+          <a:ext cx="2092010" cy="2149870"/>
         </a:xfrm>
         <a:prstGeom prst="rect">
           <a:avLst/>
@@ -1867,19 +1910,19 @@
             </a:spcAft>
           </a:pPr>
           <a:r>
-            <a:rPr lang="fr-FR" sz="1400" kern="1200" dirty="0" smtClean="0">
+            <a:rPr lang="fr-FR" sz="1400" b="1" kern="1200" dirty="0" smtClean="0">
               <a:latin typeface="Agency FB" pitchFamily="34" charset="0"/>
             </a:rPr>
             <a:t>Grand catalogue de fonctionnalités prédéfinies.</a:t>
           </a:r>
-          <a:endParaRPr lang="fr-FR" sz="1400" kern="1200" dirty="0">
+          <a:endParaRPr lang="fr-FR" sz="1400" b="1" kern="1200" dirty="0">
             <a:latin typeface="Agency FB" pitchFamily="34" charset="0"/>
           </a:endParaRPr>
         </a:p>
       </dsp:txBody>
       <dsp:txXfrm>
-        <a:off x="4071399" y="962243"/>
-        <a:ext cx="1142451" cy="2437908"/>
+        <a:off x="3522437" y="1162505"/>
+        <a:ext cx="2092010" cy="2149870"/>
       </dsp:txXfrm>
     </dsp:sp>
   </dsp:spTree>
@@ -16298,7 +16341,7 @@
       </p:pic>
       <p:pic>
         <p:nvPicPr>
-          <p:cNvPr id="3074" name="Picture 2"/>
+          <p:cNvPr id="3075" name="Picture 3" descr="E:\team-war\PFE\Doc\Images\modelisationBis.png"/>
           <p:cNvPicPr>
             <a:picLocks noChangeAspect="1" noChangeArrowheads="1"/>
           </p:cNvPicPr>
@@ -16313,24 +16356,18 @@
         </p:blipFill>
         <p:spPr bwMode="auto">
           <a:xfrm>
-            <a:off x="3131840" y="4725144"/>
-            <a:ext cx="4176464" cy="1900436"/>
+            <a:off x="2123729" y="1412776"/>
+            <a:ext cx="6480720" cy="3060700"/>
           </a:xfrm>
           <a:prstGeom prst="rect">
             <a:avLst/>
           </a:prstGeom>
           <a:noFill/>
-          <a:ln w="9525">
-            <a:noFill/>
-            <a:miter lim="800000"/>
-            <a:headEnd/>
-            <a:tailEnd/>
-          </a:ln>
         </p:spPr>
       </p:pic>
       <p:pic>
         <p:nvPicPr>
-          <p:cNvPr id="3075" name="Picture 3" descr="E:\team-war\PFE\Doc\Images\modelisationBis.png"/>
+          <p:cNvPr id="1026" name="Picture 2" descr="E:\team-war\PFE\Doc\Images\analogie.png"/>
           <p:cNvPicPr>
             <a:picLocks noChangeAspect="1" noChangeArrowheads="1"/>
           </p:cNvPicPr>
@@ -16345,8 +16382,8 @@
         </p:blipFill>
         <p:spPr bwMode="auto">
           <a:xfrm>
-            <a:off x="2123729" y="1412776"/>
-            <a:ext cx="6480720" cy="3060700"/>
+            <a:off x="3851920" y="4504672"/>
+            <a:ext cx="3168352" cy="2162477"/>
           </a:xfrm>
           <a:prstGeom prst="rect">
             <a:avLst/>
@@ -23120,162 +23157,6 @@
           </a:p>
         </p:txBody>
       </p:sp>
-      <p:sp>
-        <p:nvSpPr>
-          <p:cNvPr id="74" name="Ellipse 73"/>
-          <p:cNvSpPr/>
-          <p:nvPr/>
-        </p:nvSpPr>
-        <p:spPr>
-          <a:xfrm>
-            <a:off x="4716016" y="4077072"/>
-            <a:ext cx="1512168" cy="288032"/>
-          </a:xfrm>
-          <a:prstGeom prst="ellipse">
-            <a:avLst/>
-          </a:prstGeom>
-        </p:spPr>
-        <p:style>
-          <a:lnRef idx="1">
-            <a:schemeClr val="accent5"/>
-          </a:lnRef>
-          <a:fillRef idx="3">
-            <a:schemeClr val="accent5"/>
-          </a:fillRef>
-          <a:effectRef idx="2">
-            <a:schemeClr val="accent5"/>
-          </a:effectRef>
-          <a:fontRef idx="minor">
-            <a:schemeClr val="lt1"/>
-          </a:fontRef>
-        </p:style>
-        <p:txBody>
-          <a:bodyPr rtlCol="0" anchor="ctr"/>
-          <a:lstStyle/>
-          <a:p>
-            <a:pPr algn="ctr"/>
-            <a:r>
-              <a:rPr lang="fr-FR" sz="1400" dirty="0" smtClean="0">
-                <a:solidFill>
-                  <a:sysClr val="windowText" lastClr="000000"/>
-                </a:solidFill>
-                <a:latin typeface="Agency FB" pitchFamily="34" charset="0"/>
-              </a:rPr>
-              <a:t>Opération</a:t>
-            </a:r>
-            <a:endParaRPr lang="fr-FR" sz="1400" dirty="0">
-              <a:solidFill>
-                <a:sysClr val="windowText" lastClr="000000"/>
-              </a:solidFill>
-              <a:latin typeface="Agency FB" pitchFamily="34" charset="0"/>
-            </a:endParaRPr>
-          </a:p>
-        </p:txBody>
-      </p:sp>
-      <p:sp>
-        <p:nvSpPr>
-          <p:cNvPr id="75" name="Ellipse 74"/>
-          <p:cNvSpPr/>
-          <p:nvPr/>
-        </p:nvSpPr>
-        <p:spPr>
-          <a:xfrm>
-            <a:off x="2195736" y="5733256"/>
-            <a:ext cx="1872208" cy="576064"/>
-          </a:xfrm>
-          <a:prstGeom prst="ellipse">
-            <a:avLst/>
-          </a:prstGeom>
-        </p:spPr>
-        <p:style>
-          <a:lnRef idx="1">
-            <a:schemeClr val="accent5"/>
-          </a:lnRef>
-          <a:fillRef idx="3">
-            <a:schemeClr val="accent5"/>
-          </a:fillRef>
-          <a:effectRef idx="2">
-            <a:schemeClr val="accent5"/>
-          </a:effectRef>
-          <a:fontRef idx="minor">
-            <a:schemeClr val="lt1"/>
-          </a:fontRef>
-        </p:style>
-        <p:txBody>
-          <a:bodyPr rtlCol="0" anchor="ctr"/>
-          <a:lstStyle/>
-          <a:p>
-            <a:pPr algn="ctr"/>
-            <a:r>
-              <a:rPr lang="fr-FR" sz="1400" dirty="0" smtClean="0">
-                <a:solidFill>
-                  <a:sysClr val="windowText" lastClr="000000"/>
-                </a:solidFill>
-                <a:latin typeface="Agency FB" pitchFamily="34" charset="0"/>
-              </a:rPr>
-              <a:t>Lot de plaques de silicium</a:t>
-            </a:r>
-            <a:endParaRPr lang="fr-FR" sz="1400" dirty="0">
-              <a:solidFill>
-                <a:sysClr val="windowText" lastClr="000000"/>
-              </a:solidFill>
-              <a:latin typeface="Agency FB" pitchFamily="34" charset="0"/>
-            </a:endParaRPr>
-          </a:p>
-        </p:txBody>
-      </p:sp>
-      <p:sp>
-        <p:nvSpPr>
-          <p:cNvPr id="76" name="Ellipse 75"/>
-          <p:cNvSpPr/>
-          <p:nvPr/>
-        </p:nvSpPr>
-        <p:spPr>
-          <a:xfrm>
-            <a:off x="7164288" y="5877272"/>
-            <a:ext cx="1728192" cy="504056"/>
-          </a:xfrm>
-          <a:prstGeom prst="ellipse">
-            <a:avLst/>
-          </a:prstGeom>
-        </p:spPr>
-        <p:style>
-          <a:lnRef idx="1">
-            <a:schemeClr val="accent5"/>
-          </a:lnRef>
-          <a:fillRef idx="3">
-            <a:schemeClr val="accent5"/>
-          </a:fillRef>
-          <a:effectRef idx="2">
-            <a:schemeClr val="accent5"/>
-          </a:effectRef>
-          <a:fontRef idx="minor">
-            <a:schemeClr val="lt1"/>
-          </a:fontRef>
-        </p:style>
-        <p:txBody>
-          <a:bodyPr rtlCol="0" anchor="ctr"/>
-          <a:lstStyle/>
-          <a:p>
-            <a:pPr algn="ctr"/>
-            <a:r>
-              <a:rPr lang="fr-FR" sz="1400" dirty="0" smtClean="0">
-                <a:solidFill>
-                  <a:sysClr val="windowText" lastClr="000000"/>
-                </a:solidFill>
-                <a:latin typeface="Agency FB" pitchFamily="34" charset="0"/>
-              </a:rPr>
-              <a:t>Machine de production</a:t>
-            </a:r>
-            <a:endParaRPr lang="fr-FR" sz="1400" dirty="0">
-              <a:solidFill>
-                <a:sysClr val="windowText" lastClr="000000"/>
-              </a:solidFill>
-              <a:latin typeface="Agency FB" pitchFamily="34" charset="0"/>
-            </a:endParaRPr>
-          </a:p>
-        </p:txBody>
-      </p:sp>
       <p:pic>
         <p:nvPicPr>
           <p:cNvPr id="4098" name="Picture 2" descr="C:\Documents and Settings\Abdel\Bureau\DiagrammeClassEntities.png"/>
@@ -23293,44 +23174,55 @@
         </p:blipFill>
         <p:spPr bwMode="auto">
           <a:xfrm>
-            <a:off x="2051720" y="2153048"/>
-            <a:ext cx="6768752" cy="3796232"/>
+            <a:off x="2843808" y="1700808"/>
+            <a:ext cx="5169681" cy="4248472"/>
           </a:xfrm>
           <a:prstGeom prst="rect">
             <a:avLst/>
           </a:prstGeom>
-          <a:noFill/>
+          <a:ln w="38100" cap="sq">
+            <a:solidFill>
+              <a:srgbClr val="000000"/>
+            </a:solidFill>
+            <a:prstDash val="solid"/>
+            <a:miter lim="800000"/>
+          </a:ln>
+          <a:effectLst>
+            <a:outerShdw blurRad="50800" dist="38100" dir="2700000" algn="tl" rotWithShape="0">
+              <a:srgbClr val="000000">
+                <a:alpha val="43000"/>
+              </a:srgbClr>
+            </a:outerShdw>
+          </a:effectLst>
         </p:spPr>
       </p:pic>
       <p:sp>
         <p:nvSpPr>
-          <p:cNvPr id="80" name="Parchemin vertical 79"/>
+          <p:cNvPr id="78" name="Organigramme : Disque magnétique 77"/>
           <p:cNvSpPr/>
           <p:nvPr/>
         </p:nvSpPr>
         <p:spPr>
           <a:xfrm>
-            <a:off x="4788024" y="908720"/>
-            <a:ext cx="1296144" cy="648072"/>
+            <a:off x="1835696" y="836712"/>
+            <a:ext cx="792088" cy="1512168"/>
           </a:xfrm>
-          <a:prstGeom prst="verticalScroll">
+          <a:prstGeom prst="flowChartMagneticDisk">
             <a:avLst/>
           </a:prstGeom>
         </p:spPr>
         <p:style>
-          <a:lnRef idx="2">
-            <a:schemeClr val="accent1">
-              <a:shade val="50000"/>
-            </a:schemeClr>
+          <a:lnRef idx="1">
+            <a:schemeClr val="accent1"/>
           </a:lnRef>
-          <a:fillRef idx="1">
+          <a:fillRef idx="2">
             <a:schemeClr val="accent1"/>
           </a:fillRef>
-          <a:effectRef idx="0">
+          <a:effectRef idx="1">
             <a:schemeClr val="accent1"/>
           </a:effectRef>
           <a:fontRef idx="minor">
-            <a:schemeClr val="lt1"/>
+            <a:schemeClr val="dk1"/>
           </a:fontRef>
         </p:style>
         <p:txBody>
@@ -23339,39 +23231,151 @@
           <a:p>
             <a:pPr algn="ctr"/>
             <a:r>
-              <a:rPr lang="fr-FR" sz="1800" dirty="0" smtClean="0">
-                <a:solidFill>
-                  <a:schemeClr val="tx1">
-                    <a:lumMod val="95000"/>
-                    <a:lumOff val="5000"/>
-                  </a:schemeClr>
-                </a:solidFill>
+              <a:rPr lang="fr-FR" sz="1600" dirty="0" smtClean="0">
+                <a:latin typeface="Agency FB" pitchFamily="34" charset="0"/>
               </a:rPr>
-              <a:t>Fichier d’entrée</a:t>
+              <a:t>Fichier d’</a:t>
             </a:r>
-            <a:endParaRPr lang="fr-FR" sz="1800" dirty="0">
-              <a:solidFill>
-                <a:schemeClr val="tx1">
-                  <a:lumMod val="95000"/>
-                  <a:lumOff val="5000"/>
-                </a:schemeClr>
-              </a:solidFill>
+            <a:r>
+              <a:rPr lang="fr-FR" sz="1600" dirty="0" smtClean="0">
+                <a:latin typeface="Agency FB" pitchFamily="34" charset="0"/>
+              </a:rPr>
+              <a:t>e</a:t>
+            </a:r>
+            <a:r>
+              <a:rPr lang="fr-FR" sz="1600" dirty="0" smtClean="0">
+                <a:latin typeface="Agency FB" pitchFamily="34" charset="0"/>
+              </a:rPr>
+              <a:t>ntrée</a:t>
+            </a:r>
+            <a:endParaRPr lang="fr-FR" sz="1600" dirty="0">
+              <a:latin typeface="Agency FB" pitchFamily="34" charset="0"/>
             </a:endParaRPr>
           </a:p>
         </p:txBody>
       </p:sp>
       <p:sp>
         <p:nvSpPr>
-          <p:cNvPr id="81" name="Flèche vers le bas 80"/>
+          <p:cNvPr id="79" name="Organigramme : Disque magnétique 78"/>
           <p:cNvSpPr/>
           <p:nvPr/>
         </p:nvSpPr>
         <p:spPr>
           <a:xfrm>
-            <a:off x="5292080" y="1628800"/>
-            <a:ext cx="216024" cy="504056"/>
+            <a:off x="8244408" y="5229200"/>
+            <a:ext cx="792088" cy="1512168"/>
           </a:xfrm>
-          <a:prstGeom prst="downArrow">
+          <a:prstGeom prst="flowChartMagneticDisk">
+            <a:avLst/>
+          </a:prstGeom>
+        </p:spPr>
+        <p:style>
+          <a:lnRef idx="1">
+            <a:schemeClr val="accent1"/>
+          </a:lnRef>
+          <a:fillRef idx="2">
+            <a:schemeClr val="accent1"/>
+          </a:fillRef>
+          <a:effectRef idx="1">
+            <a:schemeClr val="accent1"/>
+          </a:effectRef>
+          <a:fontRef idx="minor">
+            <a:schemeClr val="dk1"/>
+          </a:fontRef>
+        </p:style>
+        <p:txBody>
+          <a:bodyPr rtlCol="0" anchor="ctr"/>
+          <a:lstStyle/>
+          <a:p>
+            <a:pPr algn="ctr"/>
+            <a:r>
+              <a:rPr lang="fr-FR" sz="1600" dirty="0" smtClean="0">
+                <a:latin typeface="Agency FB" pitchFamily="34" charset="0"/>
+              </a:rPr>
+              <a:t>Fichier résultat</a:t>
+            </a:r>
+            <a:endParaRPr lang="fr-FR" sz="1600" dirty="0">
+              <a:latin typeface="Agency FB" pitchFamily="34" charset="0"/>
+            </a:endParaRPr>
+          </a:p>
+        </p:txBody>
+      </p:sp>
+      <p:pic>
+        <p:nvPicPr>
+          <p:cNvPr id="2050" name="Picture 2"/>
+          <p:cNvPicPr>
+            <a:picLocks noChangeAspect="1" noChangeArrowheads="1"/>
+          </p:cNvPicPr>
+          <p:nvPr/>
+        </p:nvPicPr>
+        <p:blipFill>
+          <a:blip r:embed="rId4" cstate="print"/>
+          <a:srcRect/>
+          <a:stretch>
+            <a:fillRect/>
+          </a:stretch>
+        </p:blipFill>
+        <p:spPr bwMode="auto">
+          <a:xfrm>
+            <a:off x="2915816" y="5373216"/>
+            <a:ext cx="2943225" cy="238125"/>
+          </a:xfrm>
+          <a:prstGeom prst="rect">
+            <a:avLst/>
+          </a:prstGeom>
+          <a:noFill/>
+          <a:ln w="9525">
+            <a:noFill/>
+            <a:miter lim="800000"/>
+            <a:headEnd/>
+            <a:tailEnd/>
+          </a:ln>
+        </p:spPr>
+      </p:pic>
+      <p:pic>
+        <p:nvPicPr>
+          <p:cNvPr id="2051" name="Picture 3"/>
+          <p:cNvPicPr>
+            <a:picLocks noChangeAspect="1" noChangeArrowheads="1"/>
+          </p:cNvPicPr>
+          <p:nvPr/>
+        </p:nvPicPr>
+        <p:blipFill>
+          <a:blip r:embed="rId5" cstate="print"/>
+          <a:srcRect/>
+          <a:stretch>
+            <a:fillRect/>
+          </a:stretch>
+        </p:blipFill>
+        <p:spPr bwMode="auto">
+          <a:xfrm>
+            <a:off x="2895575" y="5661248"/>
+            <a:ext cx="3476625" cy="266700"/>
+          </a:xfrm>
+          <a:prstGeom prst="rect">
+            <a:avLst/>
+          </a:prstGeom>
+          <a:noFill/>
+          <a:ln w="9525">
+            <a:noFill/>
+            <a:miter lim="800000"/>
+            <a:headEnd/>
+            <a:tailEnd/>
+          </a:ln>
+        </p:spPr>
+      </p:pic>
+      <p:sp>
+        <p:nvSpPr>
+          <p:cNvPr id="88" name="Flèche à angle droit 87"/>
+          <p:cNvSpPr/>
+          <p:nvPr/>
+        </p:nvSpPr>
+        <p:spPr>
+          <a:xfrm rot="5400000">
+            <a:off x="2015716" y="2528900"/>
+            <a:ext cx="648072" cy="432048"/>
+          </a:xfrm>
+          <a:prstGeom prst="bentUpArrow">
             <a:avLst/>
           </a:prstGeom>
         </p:spPr>
@@ -23402,16 +23406,16 @@
       </p:sp>
       <p:sp>
         <p:nvSpPr>
-          <p:cNvPr id="71" name="Parchemin vertical 70"/>
+          <p:cNvPr id="91" name="Virage 90"/>
           <p:cNvSpPr/>
           <p:nvPr/>
         </p:nvSpPr>
         <p:spPr>
-          <a:xfrm>
-            <a:off x="4860032" y="6021288"/>
-            <a:ext cx="1296144" cy="648072"/>
+          <a:xfrm rot="5400000">
+            <a:off x="8046386" y="4599130"/>
+            <a:ext cx="684076" cy="432048"/>
           </a:xfrm>
-          <a:prstGeom prst="verticalScroll">
+          <a:prstGeom prst="bentArrow">
             <a:avLst/>
           </a:prstGeom>
         </p:spPr>
@@ -23436,65 +23440,11 @@
           <a:lstStyle/>
           <a:p>
             <a:pPr algn="ctr"/>
-            <a:r>
-              <a:rPr lang="fr-FR" sz="1800" dirty="0" smtClean="0">
-                <a:solidFill>
-                  <a:schemeClr val="tx1">
-                    <a:lumMod val="95000"/>
-                    <a:lumOff val="5000"/>
-                  </a:schemeClr>
-                </a:solidFill>
-              </a:rPr>
-              <a:t>Fichier Résultat</a:t>
-            </a:r>
-            <a:endParaRPr lang="fr-FR" sz="1800" dirty="0">
+            <a:endParaRPr lang="fr-FR">
               <a:solidFill>
-                <a:schemeClr val="tx1">
-                  <a:lumMod val="95000"/>
-                  <a:lumOff val="5000"/>
-                </a:schemeClr>
+                <a:schemeClr val="tx1"/>
               </a:solidFill>
             </a:endParaRPr>
-          </a:p>
-        </p:txBody>
-      </p:sp>
-      <p:sp>
-        <p:nvSpPr>
-          <p:cNvPr id="77" name="Flèche vers le bas 76"/>
-          <p:cNvSpPr/>
-          <p:nvPr/>
-        </p:nvSpPr>
-        <p:spPr>
-          <a:xfrm>
-            <a:off x="5292080" y="5445224"/>
-            <a:ext cx="216024" cy="504056"/>
-          </a:xfrm>
-          <a:prstGeom prst="downArrow">
-            <a:avLst/>
-          </a:prstGeom>
-        </p:spPr>
-        <p:style>
-          <a:lnRef idx="2">
-            <a:schemeClr val="accent1">
-              <a:shade val="50000"/>
-            </a:schemeClr>
-          </a:lnRef>
-          <a:fillRef idx="1">
-            <a:schemeClr val="accent1"/>
-          </a:fillRef>
-          <a:effectRef idx="0">
-            <a:schemeClr val="accent1"/>
-          </a:effectRef>
-          <a:fontRef idx="minor">
-            <a:schemeClr val="lt1"/>
-          </a:fontRef>
-        </p:style>
-        <p:txBody>
-          <a:bodyPr rtlCol="0" anchor="ctr"/>
-          <a:lstStyle/>
-          <a:p>
-            <a:pPr algn="ctr"/>
-            <a:endParaRPr lang="fr-FR"/>
           </a:p>
         </p:txBody>
       </p:sp>
@@ -26882,7 +26832,7 @@
           <p:nvPr/>
         </p:nvGraphicFramePr>
         <p:xfrm>
-          <a:off x="2267744" y="3861048"/>
+          <a:off x="2267744" y="4293096"/>
           <a:ext cx="6288360" cy="1800200"/>
         </p:xfrm>
         <a:graphic>
@@ -27148,18 +27098,95 @@
             <a:off x="3995936" y="1628800"/>
             <a:ext cx="2295525" cy="1512168"/>
           </a:xfrm>
+          <a:prstGeom prst="round2DiagRect">
+            <a:avLst>
+              <a:gd name="adj1" fmla="val 16667"/>
+              <a:gd name="adj2" fmla="val 0"/>
+            </a:avLst>
+          </a:prstGeom>
+          <a:ln w="88900" cap="sq">
+            <a:solidFill>
+              <a:srgbClr val="FFFFFF"/>
+            </a:solidFill>
+            <a:miter lim="800000"/>
+          </a:ln>
+          <a:effectLst>
+            <a:outerShdw blurRad="254000" algn="tl" rotWithShape="0">
+              <a:srgbClr val="000000">
+                <a:alpha val="43000"/>
+              </a:srgbClr>
+            </a:outerShdw>
+          </a:effectLst>
+        </p:spPr>
+      </p:pic>
+      <p:sp>
+        <p:nvSpPr>
+          <p:cNvPr id="70" name="ZoneTexte 69"/>
+          <p:cNvSpPr txBox="1"/>
+          <p:nvPr/>
+        </p:nvSpPr>
+        <p:spPr>
+          <a:xfrm>
+            <a:off x="3923928" y="3687415"/>
+            <a:ext cx="2088232" cy="461665"/>
+          </a:xfrm>
           <a:prstGeom prst="rect">
             <a:avLst/>
           </a:prstGeom>
           <a:noFill/>
-          <a:ln w="9525">
-            <a:noFill/>
-            <a:miter lim="800000"/>
-            <a:headEnd/>
-            <a:tailEnd/>
-          </a:ln>
         </p:spPr>
-      </p:pic>
+        <p:txBody>
+          <a:bodyPr wrap="square" rtlCol="0">
+            <a:spAutoFit/>
+          </a:bodyPr>
+          <a:lstStyle/>
+          <a:p>
+            <a:r>
+              <a:rPr lang="fr-FR" dirty="0" smtClean="0">
+                <a:latin typeface="Agency FB" pitchFamily="34" charset="0"/>
+              </a:rPr>
+              <a:t>Fichier Résultat :</a:t>
+            </a:r>
+            <a:endParaRPr lang="fr-FR" dirty="0">
+              <a:latin typeface="Agency FB" pitchFamily="34" charset="0"/>
+            </a:endParaRPr>
+          </a:p>
+        </p:txBody>
+      </p:sp>
+      <p:sp>
+        <p:nvSpPr>
+          <p:cNvPr id="72" name="ZoneTexte 71"/>
+          <p:cNvSpPr txBox="1"/>
+          <p:nvPr/>
+        </p:nvSpPr>
+        <p:spPr>
+          <a:xfrm>
+            <a:off x="3995936" y="980728"/>
+            <a:ext cx="2088232" cy="461665"/>
+          </a:xfrm>
+          <a:prstGeom prst="rect">
+            <a:avLst/>
+          </a:prstGeom>
+          <a:noFill/>
+        </p:spPr>
+        <p:txBody>
+          <a:bodyPr wrap="square" rtlCol="0">
+            <a:spAutoFit/>
+          </a:bodyPr>
+          <a:lstStyle/>
+          <a:p>
+            <a:r>
+              <a:rPr lang="fr-FR" dirty="0" smtClean="0">
+                <a:latin typeface="Agency FB" pitchFamily="34" charset="0"/>
+              </a:rPr>
+              <a:t>Paramètres :</a:t>
+            </a:r>
+            <a:endParaRPr lang="fr-FR" dirty="0">
+              <a:latin typeface="Agency FB" pitchFamily="34" charset="0"/>
+            </a:endParaRPr>
+          </a:p>
+        </p:txBody>
+      </p:sp>
     </p:spTree>
   </p:cSld>
   <p:clrMapOvr>
@@ -28353,18 +28380,18 @@
               <a:t>Résultat obtenus : </a:t>
             </a:r>
             <a:r>
-              <a:rPr lang="fr-FR" altLang="zh-CN" sz="3000" dirty="0" err="1" smtClean="0">
+              <a:rPr lang="fr-FR" altLang="zh-CN" sz="3000" dirty="0" smtClean="0">
                 <a:latin typeface="Times New Roman" pitchFamily="18" charset="0"/>
                 <a:cs typeface="Times New Roman" pitchFamily="18" charset="0"/>
               </a:rPr>
-              <a:t>Representation</a:t>
+              <a:t>Représentation </a:t>
             </a:r>
             <a:r>
               <a:rPr lang="fr-FR" altLang="zh-CN" sz="3000" dirty="0" smtClean="0">
                 <a:latin typeface="Times New Roman" pitchFamily="18" charset="0"/>
                 <a:cs typeface="Times New Roman" pitchFamily="18" charset="0"/>
               </a:rPr>
-              <a:t> graphique</a:t>
+              <a:t>graphique</a:t>
             </a:r>
             <a:endParaRPr lang="fr-FR" altLang="zh-CN" sz="3000" dirty="0">
               <a:latin typeface="Times New Roman" pitchFamily="18" charset="0"/>
@@ -34255,43 +34282,193 @@
           </a:p>
         </p:txBody>
       </p:sp>
-      <p:sp>
-        <p:nvSpPr>
-          <p:cNvPr id="87" name="ZoneTexte 86"/>
-          <p:cNvSpPr txBox="1"/>
+      <p:pic>
+        <p:nvPicPr>
+          <p:cNvPr id="3074" name="Picture 2"/>
+          <p:cNvPicPr>
+            <a:picLocks noChangeAspect="1" noChangeArrowheads="1"/>
+          </p:cNvPicPr>
           <p:nvPr/>
-        </p:nvSpPr>
-        <p:spPr>
+        </p:nvPicPr>
+        <p:blipFill>
+          <a:blip r:embed="rId2" cstate="print"/>
+          <a:srcRect/>
+          <a:stretch>
+            <a:fillRect/>
+          </a:stretch>
+        </p:blipFill>
+        <p:spPr bwMode="auto">
           <a:xfrm>
-            <a:off x="2143125" y="928688"/>
-            <a:ext cx="6643688" cy="523220"/>
+            <a:off x="2123728" y="1556792"/>
+            <a:ext cx="608831" cy="470460"/>
           </a:xfrm>
           <a:prstGeom prst="rect">
             <a:avLst/>
           </a:prstGeom>
           <a:noFill/>
+          <a:ln w="9525">
+            <a:noFill/>
+            <a:miter lim="800000"/>
+            <a:headEnd/>
+            <a:tailEnd/>
+          </a:ln>
         </p:spPr>
+      </p:pic>
+      <p:sp>
+        <p:nvSpPr>
+          <p:cNvPr id="84" name="Triangle isocèle 83"/>
+          <p:cNvSpPr/>
+          <p:nvPr/>
+        </p:nvSpPr>
+        <p:spPr>
+          <a:xfrm>
+            <a:off x="2267744" y="3717032"/>
+            <a:ext cx="360040" cy="288032"/>
+          </a:xfrm>
+          <a:prstGeom prst="triangle">
+            <a:avLst/>
+          </a:prstGeom>
+        </p:spPr>
+        <p:style>
+          <a:lnRef idx="2">
+            <a:schemeClr val="accent1">
+              <a:shade val="50000"/>
+            </a:schemeClr>
+          </a:lnRef>
+          <a:fillRef idx="1">
+            <a:schemeClr val="accent1"/>
+          </a:fillRef>
+          <a:effectRef idx="0">
+            <a:schemeClr val="accent1"/>
+          </a:effectRef>
+          <a:fontRef idx="minor">
+            <a:schemeClr val="lt1"/>
+          </a:fontRef>
+        </p:style>
         <p:txBody>
-          <a:bodyPr>
-            <a:spAutoFit/>
-          </a:bodyPr>
+          <a:bodyPr rtlCol="0" anchor="ctr"/>
           <a:lstStyle/>
           <a:p>
-            <a:pPr algn="just"/>
-            <a:r>
-              <a:rPr lang="fr-FR" sz="2800" dirty="0" smtClean="0">
-                <a:latin typeface="Times New Roman" pitchFamily="18" charset="0"/>
-                <a:cs typeface="Times New Roman" pitchFamily="18" charset="0"/>
-              </a:rPr>
-              <a:t>coco</a:t>
-            </a:r>
-            <a:endParaRPr lang="fr-FR" sz="2500" dirty="0" smtClean="0">
-              <a:latin typeface="Times New Roman" pitchFamily="18" charset="0"/>
-              <a:cs typeface="Times New Roman" pitchFamily="18" charset="0"/>
-            </a:endParaRPr>
+            <a:pPr algn="ctr"/>
+            <a:endParaRPr lang="fr-FR"/>
           </a:p>
         </p:txBody>
       </p:sp>
+      <p:graphicFrame>
+        <p:nvGraphicFramePr>
+          <p:cNvPr id="88" name="Tableau 87"/>
+          <p:cNvGraphicFramePr>
+            <a:graphicFrameLocks noGrp="1"/>
+          </p:cNvGraphicFramePr>
+          <p:nvPr/>
+        </p:nvGraphicFramePr>
+        <p:xfrm>
+          <a:off x="2123728" y="3717032"/>
+          <a:ext cx="6096000" cy="2108200"/>
+        </p:xfrm>
+        <a:graphic>
+          <a:graphicData uri="http://schemas.openxmlformats.org/drawingml/2006/table">
+            <a:tbl>
+              <a:tblPr firstRow="1" bandRow="1">
+                <a:tableStyleId>{5C22544A-7EE6-4342-B048-85BDC9FD1C3A}</a:tableStyleId>
+              </a:tblPr>
+              <a:tblGrid>
+                <a:gridCol w="6096000"/>
+              </a:tblGrid>
+              <a:tr h="370840">
+                <a:tc>
+                  <a:txBody>
+                    <a:bodyPr/>
+                    <a:lstStyle/>
+                    <a:p>
+                      <a:pPr marL="0" marR="0" indent="0" algn="ctr" defTabSz="914400" rtl="0" eaLnBrk="1" fontAlgn="auto" latinLnBrk="0" hangingPunct="1">
+                        <a:lnSpc>
+                          <a:spcPct val="100000"/>
+                        </a:lnSpc>
+                        <a:spcBef>
+                          <a:spcPts val="0"/>
+                        </a:spcBef>
+                        <a:spcAft>
+                          <a:spcPts val="0"/>
+                        </a:spcAft>
+                        <a:buClrTx/>
+                        <a:buSzTx/>
+                        <a:buFontTx/>
+                        <a:buNone/>
+                        <a:tabLst/>
+                        <a:defRPr/>
+                      </a:pPr>
+                      <a:r>
+                        <a:rPr lang="fr-FR" sz="1800" b="1" kern="1200" baseline="0" dirty="0" smtClean="0">
+                          <a:solidFill>
+                            <a:schemeClr val="tx1">
+                              <a:lumMod val="95000"/>
+                              <a:lumOff val="5000"/>
+                            </a:schemeClr>
+                          </a:solidFill>
+                          <a:latin typeface="+mn-lt"/>
+                          <a:ea typeface="+mn-ea"/>
+                          <a:cs typeface="+mn-cs"/>
+                        </a:rPr>
+                        <a:t>Pistes d’amélioration</a:t>
+                      </a:r>
+                    </a:p>
+                  </a:txBody>
+                  <a:tcPr/>
+                </a:tc>
+              </a:tr>
+              <a:tr h="370840">
+                <a:tc>
+                  <a:txBody>
+                    <a:bodyPr/>
+                    <a:lstStyle/>
+                    <a:p>
+                      <a:r>
+                        <a:rPr lang="fr-FR" sz="1800" kern="1200" baseline="0" dirty="0" smtClean="0">
+                          <a:solidFill>
+                            <a:schemeClr val="dk1"/>
+                          </a:solidFill>
+                          <a:latin typeface="+mn-lt"/>
+                          <a:ea typeface="+mn-ea"/>
+                          <a:cs typeface="+mn-cs"/>
+                        </a:rPr>
+                        <a:t>– Optimisation du temps de calcul.(Choisir un langage plus proche de la machine 4, optimisation des boucles, diminution du niveau de complexité de l’algorithme)</a:t>
+                      </a:r>
+                    </a:p>
+                    <a:p>
+                      <a:r>
+                        <a:rPr lang="fr-FR" sz="1800" kern="1200" baseline="0" dirty="0" smtClean="0">
+                          <a:solidFill>
+                            <a:schemeClr val="dk1"/>
+                          </a:solidFill>
+                          <a:latin typeface="+mn-lt"/>
+                          <a:ea typeface="+mn-ea"/>
+                          <a:cs typeface="+mn-cs"/>
+                        </a:rPr>
+                        <a:t>–Prendre en compte le type de la technologie observée pour calculer la fiabilité.</a:t>
+                      </a:r>
+                    </a:p>
+                    <a:p>
+                      <a:r>
+                        <a:rPr lang="fr-FR" sz="1800" kern="1200" baseline="0" dirty="0" smtClean="0">
+                          <a:solidFill>
+                            <a:schemeClr val="dk1"/>
+                          </a:solidFill>
+                          <a:latin typeface="+mn-lt"/>
+                          <a:ea typeface="+mn-ea"/>
+                          <a:cs typeface="+mn-cs"/>
+                        </a:rPr>
+                        <a:t>– Les machines peuvent avoir des poids différents.</a:t>
+                      </a:r>
+                    </a:p>
+                  </a:txBody>
+                  <a:tcPr/>
+                </a:tc>
+              </a:tr>
+            </a:tbl>
+          </a:graphicData>
+        </a:graphic>
+      </p:graphicFrame>
     </p:spTree>
   </p:cSld>
   <p:clrMapOvr>
@@ -34307,6 +34484,82 @@
       </p:par>
     </p:tnLst>
   </p:timing>
+</p:sld>
+</file>
+
+<file path=ppt/slides/slide7.xml><?xml version="1.0" encoding="utf-8"?>
+<p:sld xmlns:a="http://schemas.openxmlformats.org/drawingml/2006/main" xmlns:r="http://schemas.openxmlformats.org/officeDocument/2006/relationships" xmlns:p="http://schemas.openxmlformats.org/presentationml/2006/main">
+  <p:cSld>
+    <p:spTree>
+      <p:nvGrpSpPr>
+        <p:cNvPr id="1" name=""/>
+        <p:cNvGrpSpPr/>
+        <p:nvPr/>
+      </p:nvGrpSpPr>
+      <p:grpSpPr>
+        <a:xfrm>
+          <a:off x="0" y="0"/>
+          <a:ext cx="0" cy="0"/>
+          <a:chOff x="0" y="0"/>
+          <a:chExt cx="0" cy="0"/>
+        </a:xfrm>
+      </p:grpSpPr>
+      <p:sp>
+        <p:nvSpPr>
+          <p:cNvPr id="2" name="Titre 1"/>
+          <p:cNvSpPr>
+            <a:spLocks noGrp="1"/>
+          </p:cNvSpPr>
+          <p:nvPr>
+            <p:ph type="title"/>
+          </p:nvPr>
+        </p:nvSpPr>
+        <p:spPr/>
+        <p:txBody>
+          <a:bodyPr/>
+          <a:lstStyle/>
+          <a:p>
+            <a:endParaRPr lang="fr-FR"/>
+          </a:p>
+        </p:txBody>
+      </p:sp>
+      <p:sp>
+        <p:nvSpPr>
+          <p:cNvPr id="3" name="Espace réservé du numéro de diapositive 2"/>
+          <p:cNvSpPr>
+            <a:spLocks noGrp="1"/>
+          </p:cNvSpPr>
+          <p:nvPr>
+            <p:ph type="sldNum" sz="quarter" idx="12"/>
+          </p:nvPr>
+        </p:nvSpPr>
+        <p:spPr/>
+        <p:txBody>
+          <a:bodyPr/>
+          <a:lstStyle/>
+          <a:p>
+            <a:pPr>
+              <a:defRPr/>
+            </a:pPr>
+            <a:fld id="{F277E299-E32A-4562-8E15-11D30C10E41F}" type="slidenum">
+              <a:rPr lang="en-GB" altLang="zh-CN" smtClean="0"/>
+              <a:pPr>
+                <a:defRPr/>
+              </a:pPr>
+              <a:t>7</a:t>
+            </a:fld>
+            <a:endParaRPr lang="en-GB" altLang="zh-CN"/>
+          </a:p>
+        </p:txBody>
+      </p:sp>
+    </p:spTree>
+  </p:cSld>
+  <p:clrMapOvr>
+    <a:masterClrMapping/>
+  </p:clrMapOvr>
+  <p:transition>
+    <p:fade/>
+  </p:transition>
 </p:sld>
 </file>
 

</xml_diff>